<commit_message>
Fix wrong title in day9
</commit_message>
<xml_diff>
--- a/slides/day9.pptx
+++ b/slides/day9.pptx
@@ -116,7 +116,7 @@
   </p:defaultTextStyle>
   <p:extLst>
     <p:ext uri="{EFAFB233-063F-42B5-8137-9DF3F51BA10A}">
-      <p15:sldGuideLst xmlns:p15="http://schemas.microsoft.com/office/powerpoint/2012/main" xmlns=""/>
+      <p15:sldGuideLst xmlns="" xmlns:p15="http://schemas.microsoft.com/office/powerpoint/2012/main"/>
     </p:ext>
   </p:extLst>
 </p:presentation>
@@ -204,7 +204,7 @@
           <a:p>
             <a:fld id="{BB3094AF-35A6-754E-8067-6A5F9463C98A}" type="datetimeFigureOut">
               <a:rPr lang="en-US" smtClean="0"/>
-              <a:t>10/3/16</a:t>
+              <a:t>10/5/16</a:t>
             </a:fld>
             <a:endParaRPr lang="en-US"/>
           </a:p>
@@ -1107,7 +1107,7 @@
           <a:p>
             <a:fld id="{4D028B56-AFB3-3645-B6C1-2E0F36FEC4DC}" type="datetimeFigureOut">
               <a:rPr lang="en-US" smtClean="0"/>
-              <a:t>10/3/16</a:t>
+              <a:t>10/5/16</a:t>
             </a:fld>
             <a:endParaRPr lang="en-US"/>
           </a:p>
@@ -1277,7 +1277,7 @@
           <a:p>
             <a:fld id="{4D028B56-AFB3-3645-B6C1-2E0F36FEC4DC}" type="datetimeFigureOut">
               <a:rPr lang="en-US" smtClean="0"/>
-              <a:t>10/3/16</a:t>
+              <a:t>10/5/16</a:t>
             </a:fld>
             <a:endParaRPr lang="en-US"/>
           </a:p>
@@ -1457,7 +1457,7 @@
           <a:p>
             <a:fld id="{4D028B56-AFB3-3645-B6C1-2E0F36FEC4DC}" type="datetimeFigureOut">
               <a:rPr lang="en-US" smtClean="0"/>
-              <a:t>10/3/16</a:t>
+              <a:t>10/5/16</a:t>
             </a:fld>
             <a:endParaRPr lang="en-US"/>
           </a:p>
@@ -1627,7 +1627,7 @@
           <a:p>
             <a:fld id="{4D028B56-AFB3-3645-B6C1-2E0F36FEC4DC}" type="datetimeFigureOut">
               <a:rPr lang="en-US" smtClean="0"/>
-              <a:t>10/3/16</a:t>
+              <a:t>10/5/16</a:t>
             </a:fld>
             <a:endParaRPr lang="en-US"/>
           </a:p>
@@ -1873,7 +1873,7 @@
           <a:p>
             <a:fld id="{4D028B56-AFB3-3645-B6C1-2E0F36FEC4DC}" type="datetimeFigureOut">
               <a:rPr lang="en-US" smtClean="0"/>
-              <a:t>10/3/16</a:t>
+              <a:t>10/5/16</a:t>
             </a:fld>
             <a:endParaRPr lang="en-US"/>
           </a:p>
@@ -2105,7 +2105,7 @@
           <a:p>
             <a:fld id="{4D028B56-AFB3-3645-B6C1-2E0F36FEC4DC}" type="datetimeFigureOut">
               <a:rPr lang="en-US" smtClean="0"/>
-              <a:t>10/3/16</a:t>
+              <a:t>10/5/16</a:t>
             </a:fld>
             <a:endParaRPr lang="en-US"/>
           </a:p>
@@ -2472,7 +2472,7 @@
           <a:p>
             <a:fld id="{4D028B56-AFB3-3645-B6C1-2E0F36FEC4DC}" type="datetimeFigureOut">
               <a:rPr lang="en-US" smtClean="0"/>
-              <a:t>10/3/16</a:t>
+              <a:t>10/5/16</a:t>
             </a:fld>
             <a:endParaRPr lang="en-US"/>
           </a:p>
@@ -2590,7 +2590,7 @@
           <a:p>
             <a:fld id="{4D028B56-AFB3-3645-B6C1-2E0F36FEC4DC}" type="datetimeFigureOut">
               <a:rPr lang="en-US" smtClean="0"/>
-              <a:t>10/3/16</a:t>
+              <a:t>10/5/16</a:t>
             </a:fld>
             <a:endParaRPr lang="en-US"/>
           </a:p>
@@ -2685,7 +2685,7 @@
           <a:p>
             <a:fld id="{4D028B56-AFB3-3645-B6C1-2E0F36FEC4DC}" type="datetimeFigureOut">
               <a:rPr lang="en-US" smtClean="0"/>
-              <a:t>10/3/16</a:t>
+              <a:t>10/5/16</a:t>
             </a:fld>
             <a:endParaRPr lang="en-US"/>
           </a:p>
@@ -2962,7 +2962,7 @@
           <a:p>
             <a:fld id="{4D028B56-AFB3-3645-B6C1-2E0F36FEC4DC}" type="datetimeFigureOut">
               <a:rPr lang="en-US" smtClean="0"/>
-              <a:t>10/3/16</a:t>
+              <a:t>10/5/16</a:t>
             </a:fld>
             <a:endParaRPr lang="en-US"/>
           </a:p>
@@ -3215,7 +3215,7 @@
           <a:p>
             <a:fld id="{4D028B56-AFB3-3645-B6C1-2E0F36FEC4DC}" type="datetimeFigureOut">
               <a:rPr lang="en-US" smtClean="0"/>
-              <a:t>10/3/16</a:t>
+              <a:t>10/5/16</a:t>
             </a:fld>
             <a:endParaRPr lang="en-US"/>
           </a:p>
@@ -3428,7 +3428,7 @@
           <a:p>
             <a:fld id="{4D028B56-AFB3-3645-B6C1-2E0F36FEC4DC}" type="datetimeFigureOut">
               <a:rPr lang="en-US" smtClean="0"/>
-              <a:t>10/3/16</a:t>
+              <a:t>10/5/16</a:t>
             </a:fld>
             <a:endParaRPr lang="en-US"/>
           </a:p>
@@ -3887,7 +3887,7 @@
                   <a:srgbClr val="1EBFFF"/>
                 </a:solidFill>
               </a:rPr>
-              <a:t>Bias-</a:t>
+              <a:t>Unsupervised Learning, </a:t>
             </a:r>
             <a:r>
               <a:rPr lang="en-US" sz="4400" dirty="0" smtClean="0">
@@ -3895,15 +3895,7 @@
                   <a:srgbClr val="1EBFFF"/>
                 </a:solidFill>
               </a:rPr>
-              <a:t>Variance Tradeoff, C</a:t>
-            </a:r>
-            <a:r>
-              <a:rPr lang="en-US" sz="4400" dirty="0" smtClean="0">
-                <a:solidFill>
-                  <a:srgbClr val="1EBFFF"/>
-                </a:solidFill>
-              </a:rPr>
-              <a:t>lustering, K-Means</a:t>
+              <a:t>Clustering, K-Means</a:t>
             </a:r>
             <a:endParaRPr lang="en-US" sz="4400" dirty="0">
               <a:solidFill>
@@ -4002,15 +3994,7 @@
             </a:r>
             <a:r>
               <a:rPr lang="en-US" dirty="0" smtClean="0"/>
-              <a:t>: </a:t>
-            </a:r>
-            <a:r>
-              <a:rPr lang="en-US" dirty="0" smtClean="0"/>
-              <a:t>[See </a:t>
-            </a:r>
-            <a:r>
-              <a:rPr lang="en-US" dirty="0" smtClean="0"/>
-              <a:t>board]</a:t>
+              <a:t>: [See board]</a:t>
             </a:r>
           </a:p>
           <a:p>
@@ -4116,6 +4100,13 @@
   <p:clrMapOvr>
     <a:masterClrMapping/>
   </p:clrMapOvr>
+  <p:timing>
+    <p:tnLst>
+      <p:par>
+        <p:cTn xmlns:p14="http://schemas.microsoft.com/office/powerpoint/2010/main" id="1" dur="indefinite" restart="never" nodeType="tmRoot"/>
+      </p:par>
+    </p:tnLst>
+  </p:timing>
 </p:sld>
 </file>
 
@@ -4298,7 +4289,6 @@
               <a:rPr lang="en-US" sz="3600" dirty="0" smtClean="0"/>
               <a:t>Intro to K-Means</a:t>
             </a:r>
-            <a:endParaRPr lang="en-US" sz="3600" dirty="0" smtClean="0"/>
           </a:p>
         </p:txBody>
       </p:sp>
@@ -6187,7 +6177,7 @@
   <a:extraClrSchemeLst/>
   <a:extLst>
     <a:ext uri="{05A4C25C-085E-4340-85A3-A5531E510DB2}">
-      <thm15:themeFamily xmlns:thm15="http://schemas.microsoft.com/office/thememl/2012/main" xmlns="" name="Office Theme" id="{62F939B6-93AF-4DB8-9C6B-D6C7DFDC589F}" vid="{4A3C46E8-61CC-4603-A589-7422A47A8E4A}"/>
+      <thm15:themeFamily xmlns="" xmlns:thm15="http://schemas.microsoft.com/office/thememl/2012/main" name="Office Theme" id="{62F939B6-93AF-4DB8-9C6B-D6C7DFDC589F}" vid="{4A3C46E8-61CC-4603-A589-7422A47A8E4A}"/>
     </a:ext>
   </a:extLst>
 </a:theme>
@@ -6448,7 +6438,7 @@
   <a:extraClrSchemeLst/>
   <a:extLst>
     <a:ext uri="{05A4C25C-085E-4340-85A3-A5531E510DB2}">
-      <thm15:themeFamily xmlns:thm15="http://schemas.microsoft.com/office/thememl/2012/main" xmlns="" name="Office Theme" id="{62F939B6-93AF-4DB8-9C6B-D6C7DFDC589F}" vid="{4A3C46E8-61CC-4603-A589-7422A47A8E4A}"/>
+      <thm15:themeFamily xmlns="" xmlns:thm15="http://schemas.microsoft.com/office/thememl/2012/main" name="Office Theme" id="{62F939B6-93AF-4DB8-9C6B-D6C7DFDC589F}" vid="{4A3C46E8-61CC-4603-A589-7422A47A8E4A}"/>
     </a:ext>
   </a:extLst>
 </a:theme>

</xml_diff>